<commit_message>
Added name parameter to Links
</commit_message>
<xml_diff>
--- a/doc/Portfolio website planning.pptx
+++ b/doc/Portfolio website planning.pptx
@@ -259,7 +259,7 @@
           <a:p>
             <a:fld id="{2A1D230E-EC42-2149-ABD7-39503694EAD2}" type="datetimeFigureOut">
               <a:rPr lang="en-US" smtClean="0"/>
-              <a:t>6/4/20</a:t>
+              <a:t>7/3/20</a:t>
             </a:fld>
             <a:endParaRPr lang="en-US"/>
           </a:p>
@@ -457,7 +457,7 @@
           <a:p>
             <a:fld id="{2A1D230E-EC42-2149-ABD7-39503694EAD2}" type="datetimeFigureOut">
               <a:rPr lang="en-US" smtClean="0"/>
-              <a:t>6/4/20</a:t>
+              <a:t>7/3/20</a:t>
             </a:fld>
             <a:endParaRPr lang="en-US"/>
           </a:p>
@@ -665,7 +665,7 @@
           <a:p>
             <a:fld id="{2A1D230E-EC42-2149-ABD7-39503694EAD2}" type="datetimeFigureOut">
               <a:rPr lang="en-US" smtClean="0"/>
-              <a:t>6/4/20</a:t>
+              <a:t>7/3/20</a:t>
             </a:fld>
             <a:endParaRPr lang="en-US"/>
           </a:p>
@@ -863,7 +863,7 @@
           <a:p>
             <a:fld id="{2A1D230E-EC42-2149-ABD7-39503694EAD2}" type="datetimeFigureOut">
               <a:rPr lang="en-US" smtClean="0"/>
-              <a:t>6/4/20</a:t>
+              <a:t>7/3/20</a:t>
             </a:fld>
             <a:endParaRPr lang="en-US"/>
           </a:p>
@@ -1138,7 +1138,7 @@
           <a:p>
             <a:fld id="{2A1D230E-EC42-2149-ABD7-39503694EAD2}" type="datetimeFigureOut">
               <a:rPr lang="en-US" smtClean="0"/>
-              <a:t>6/4/20</a:t>
+              <a:t>7/3/20</a:t>
             </a:fld>
             <a:endParaRPr lang="en-US"/>
           </a:p>
@@ -1403,7 +1403,7 @@
           <a:p>
             <a:fld id="{2A1D230E-EC42-2149-ABD7-39503694EAD2}" type="datetimeFigureOut">
               <a:rPr lang="en-US" smtClean="0"/>
-              <a:t>6/4/20</a:t>
+              <a:t>7/3/20</a:t>
             </a:fld>
             <a:endParaRPr lang="en-US"/>
           </a:p>
@@ -1815,7 +1815,7 @@
           <a:p>
             <a:fld id="{2A1D230E-EC42-2149-ABD7-39503694EAD2}" type="datetimeFigureOut">
               <a:rPr lang="en-US" smtClean="0"/>
-              <a:t>6/4/20</a:t>
+              <a:t>7/3/20</a:t>
             </a:fld>
             <a:endParaRPr lang="en-US"/>
           </a:p>
@@ -1956,7 +1956,7 @@
           <a:p>
             <a:fld id="{2A1D230E-EC42-2149-ABD7-39503694EAD2}" type="datetimeFigureOut">
               <a:rPr lang="en-US" smtClean="0"/>
-              <a:t>6/4/20</a:t>
+              <a:t>7/3/20</a:t>
             </a:fld>
             <a:endParaRPr lang="en-US"/>
           </a:p>
@@ -2069,7 +2069,7 @@
           <a:p>
             <a:fld id="{2A1D230E-EC42-2149-ABD7-39503694EAD2}" type="datetimeFigureOut">
               <a:rPr lang="en-US" smtClean="0"/>
-              <a:t>6/4/20</a:t>
+              <a:t>7/3/20</a:t>
             </a:fld>
             <a:endParaRPr lang="en-US"/>
           </a:p>
@@ -2380,7 +2380,7 @@
           <a:p>
             <a:fld id="{2A1D230E-EC42-2149-ABD7-39503694EAD2}" type="datetimeFigureOut">
               <a:rPr lang="en-US" smtClean="0"/>
-              <a:t>6/4/20</a:t>
+              <a:t>7/3/20</a:t>
             </a:fld>
             <a:endParaRPr lang="en-US"/>
           </a:p>
@@ -2668,7 +2668,7 @@
           <a:p>
             <a:fld id="{2A1D230E-EC42-2149-ABD7-39503694EAD2}" type="datetimeFigureOut">
               <a:rPr lang="en-US" smtClean="0"/>
-              <a:t>6/4/20</a:t>
+              <a:t>7/3/20</a:t>
             </a:fld>
             <a:endParaRPr lang="en-US"/>
           </a:p>
@@ -2909,7 +2909,7 @@
           <a:p>
             <a:fld id="{2A1D230E-EC42-2149-ABD7-39503694EAD2}" type="datetimeFigureOut">
               <a:rPr lang="en-US" smtClean="0"/>
-              <a:t>6/4/20</a:t>
+              <a:t>7/3/20</a:t>
             </a:fld>
             <a:endParaRPr lang="en-US"/>
           </a:p>
@@ -4200,7 +4200,7 @@
         <p:spPr>
           <a:xfrm>
             <a:off x="4574041" y="3941763"/>
-            <a:ext cx="2049216" cy="1973259"/>
+            <a:ext cx="2049216" cy="2483100"/>
           </a:xfrm>
           <a:prstGeom prst="rect">
             <a:avLst/>
@@ -4266,6 +4266,16 @@
                 </a:solidFill>
               </a:rPr>
               <a:t>id	int</a:t>
+            </a:r>
+          </a:p>
+          <a:p>
+            <a:r>
+              <a:rPr lang="en-US" dirty="0">
+                <a:solidFill>
+                  <a:schemeClr val="tx1"/>
+                </a:solidFill>
+              </a:rPr>
+              <a:t>name	string</a:t>
             </a:r>
           </a:p>
           <a:p>

</xml_diff>

<commit_message>
Renamed tag "type" column to "category"
Apparently "type" is a reserved column name. Oops!
</commit_message>
<xml_diff>
--- a/doc/Portfolio website planning.pptx
+++ b/doc/Portfolio website planning.pptx
@@ -259,7 +259,7 @@
           <a:p>
             <a:fld id="{2A1D230E-EC42-2149-ABD7-39503694EAD2}" type="datetimeFigureOut">
               <a:rPr lang="en-US" smtClean="0"/>
-              <a:t>7/3/20</a:t>
+              <a:t>7/5/20</a:t>
             </a:fld>
             <a:endParaRPr lang="en-US"/>
           </a:p>
@@ -457,7 +457,7 @@
           <a:p>
             <a:fld id="{2A1D230E-EC42-2149-ABD7-39503694EAD2}" type="datetimeFigureOut">
               <a:rPr lang="en-US" smtClean="0"/>
-              <a:t>7/3/20</a:t>
+              <a:t>7/5/20</a:t>
             </a:fld>
             <a:endParaRPr lang="en-US"/>
           </a:p>
@@ -665,7 +665,7 @@
           <a:p>
             <a:fld id="{2A1D230E-EC42-2149-ABD7-39503694EAD2}" type="datetimeFigureOut">
               <a:rPr lang="en-US" smtClean="0"/>
-              <a:t>7/3/20</a:t>
+              <a:t>7/5/20</a:t>
             </a:fld>
             <a:endParaRPr lang="en-US"/>
           </a:p>
@@ -863,7 +863,7 @@
           <a:p>
             <a:fld id="{2A1D230E-EC42-2149-ABD7-39503694EAD2}" type="datetimeFigureOut">
               <a:rPr lang="en-US" smtClean="0"/>
-              <a:t>7/3/20</a:t>
+              <a:t>7/5/20</a:t>
             </a:fld>
             <a:endParaRPr lang="en-US"/>
           </a:p>
@@ -1138,7 +1138,7 @@
           <a:p>
             <a:fld id="{2A1D230E-EC42-2149-ABD7-39503694EAD2}" type="datetimeFigureOut">
               <a:rPr lang="en-US" smtClean="0"/>
-              <a:t>7/3/20</a:t>
+              <a:t>7/5/20</a:t>
             </a:fld>
             <a:endParaRPr lang="en-US"/>
           </a:p>
@@ -1403,7 +1403,7 @@
           <a:p>
             <a:fld id="{2A1D230E-EC42-2149-ABD7-39503694EAD2}" type="datetimeFigureOut">
               <a:rPr lang="en-US" smtClean="0"/>
-              <a:t>7/3/20</a:t>
+              <a:t>7/5/20</a:t>
             </a:fld>
             <a:endParaRPr lang="en-US"/>
           </a:p>
@@ -1815,7 +1815,7 @@
           <a:p>
             <a:fld id="{2A1D230E-EC42-2149-ABD7-39503694EAD2}" type="datetimeFigureOut">
               <a:rPr lang="en-US" smtClean="0"/>
-              <a:t>7/3/20</a:t>
+              <a:t>7/5/20</a:t>
             </a:fld>
             <a:endParaRPr lang="en-US"/>
           </a:p>
@@ -1956,7 +1956,7 @@
           <a:p>
             <a:fld id="{2A1D230E-EC42-2149-ABD7-39503694EAD2}" type="datetimeFigureOut">
               <a:rPr lang="en-US" smtClean="0"/>
-              <a:t>7/3/20</a:t>
+              <a:t>7/5/20</a:t>
             </a:fld>
             <a:endParaRPr lang="en-US"/>
           </a:p>
@@ -2069,7 +2069,7 @@
           <a:p>
             <a:fld id="{2A1D230E-EC42-2149-ABD7-39503694EAD2}" type="datetimeFigureOut">
               <a:rPr lang="en-US" smtClean="0"/>
-              <a:t>7/3/20</a:t>
+              <a:t>7/5/20</a:t>
             </a:fld>
             <a:endParaRPr lang="en-US"/>
           </a:p>
@@ -2380,7 +2380,7 @@
           <a:p>
             <a:fld id="{2A1D230E-EC42-2149-ABD7-39503694EAD2}" type="datetimeFigureOut">
               <a:rPr lang="en-US" smtClean="0"/>
-              <a:t>7/3/20</a:t>
+              <a:t>7/5/20</a:t>
             </a:fld>
             <a:endParaRPr lang="en-US"/>
           </a:p>
@@ -2668,7 +2668,7 @@
           <a:p>
             <a:fld id="{2A1D230E-EC42-2149-ABD7-39503694EAD2}" type="datetimeFigureOut">
               <a:rPr lang="en-US" smtClean="0"/>
-              <a:t>7/3/20</a:t>
+              <a:t>7/5/20</a:t>
             </a:fld>
             <a:endParaRPr lang="en-US"/>
           </a:p>
@@ -2909,7 +2909,7 @@
           <a:p>
             <a:fld id="{2A1D230E-EC42-2149-ABD7-39503694EAD2}" type="datetimeFigureOut">
               <a:rPr lang="en-US" smtClean="0"/>
-              <a:t>7/3/20</a:t>
+              <a:t>7/5/20</a:t>
             </a:fld>
             <a:endParaRPr lang="en-US"/>
           </a:p>
@@ -3580,12 +3580,20 @@
           </a:p>
           <a:p>
             <a:r>
+              <a:rPr lang="en-US">
+                <a:solidFill>
+                  <a:schemeClr val="tx1"/>
+                </a:solidFill>
+              </a:rPr>
+              <a:t>category</a:t>
+            </a:r>
+            <a:r>
               <a:rPr lang="en-US" dirty="0">
                 <a:solidFill>
                   <a:schemeClr val="tx1"/>
                 </a:solidFill>
               </a:rPr>
-              <a:t>type	string</a:t>
+              <a:t>	string</a:t>
             </a:r>
           </a:p>
           <a:p>

</xml_diff>

<commit_message>
Wrote a data dictionary
</commit_message>
<xml_diff>
--- a/doc/Portfolio website planning.pptx
+++ b/doc/Portfolio website planning.pptx
@@ -259,7 +259,7 @@
           <a:p>
             <a:fld id="{2A1D230E-EC42-2149-ABD7-39503694EAD2}" type="datetimeFigureOut">
               <a:rPr lang="en-US" smtClean="0"/>
-              <a:t>7/5/20</a:t>
+              <a:t>7/14/20</a:t>
             </a:fld>
             <a:endParaRPr lang="en-US"/>
           </a:p>
@@ -457,7 +457,7 @@
           <a:p>
             <a:fld id="{2A1D230E-EC42-2149-ABD7-39503694EAD2}" type="datetimeFigureOut">
               <a:rPr lang="en-US" smtClean="0"/>
-              <a:t>7/5/20</a:t>
+              <a:t>7/14/20</a:t>
             </a:fld>
             <a:endParaRPr lang="en-US"/>
           </a:p>
@@ -665,7 +665,7 @@
           <a:p>
             <a:fld id="{2A1D230E-EC42-2149-ABD7-39503694EAD2}" type="datetimeFigureOut">
               <a:rPr lang="en-US" smtClean="0"/>
-              <a:t>7/5/20</a:t>
+              <a:t>7/14/20</a:t>
             </a:fld>
             <a:endParaRPr lang="en-US"/>
           </a:p>
@@ -863,7 +863,7 @@
           <a:p>
             <a:fld id="{2A1D230E-EC42-2149-ABD7-39503694EAD2}" type="datetimeFigureOut">
               <a:rPr lang="en-US" smtClean="0"/>
-              <a:t>7/5/20</a:t>
+              <a:t>7/14/20</a:t>
             </a:fld>
             <a:endParaRPr lang="en-US"/>
           </a:p>
@@ -1138,7 +1138,7 @@
           <a:p>
             <a:fld id="{2A1D230E-EC42-2149-ABD7-39503694EAD2}" type="datetimeFigureOut">
               <a:rPr lang="en-US" smtClean="0"/>
-              <a:t>7/5/20</a:t>
+              <a:t>7/14/20</a:t>
             </a:fld>
             <a:endParaRPr lang="en-US"/>
           </a:p>
@@ -1403,7 +1403,7 @@
           <a:p>
             <a:fld id="{2A1D230E-EC42-2149-ABD7-39503694EAD2}" type="datetimeFigureOut">
               <a:rPr lang="en-US" smtClean="0"/>
-              <a:t>7/5/20</a:t>
+              <a:t>7/14/20</a:t>
             </a:fld>
             <a:endParaRPr lang="en-US"/>
           </a:p>
@@ -1815,7 +1815,7 @@
           <a:p>
             <a:fld id="{2A1D230E-EC42-2149-ABD7-39503694EAD2}" type="datetimeFigureOut">
               <a:rPr lang="en-US" smtClean="0"/>
-              <a:t>7/5/20</a:t>
+              <a:t>7/14/20</a:t>
             </a:fld>
             <a:endParaRPr lang="en-US"/>
           </a:p>
@@ -1956,7 +1956,7 @@
           <a:p>
             <a:fld id="{2A1D230E-EC42-2149-ABD7-39503694EAD2}" type="datetimeFigureOut">
               <a:rPr lang="en-US" smtClean="0"/>
-              <a:t>7/5/20</a:t>
+              <a:t>7/14/20</a:t>
             </a:fld>
             <a:endParaRPr lang="en-US"/>
           </a:p>
@@ -2069,7 +2069,7 @@
           <a:p>
             <a:fld id="{2A1D230E-EC42-2149-ABD7-39503694EAD2}" type="datetimeFigureOut">
               <a:rPr lang="en-US" smtClean="0"/>
-              <a:t>7/5/20</a:t>
+              <a:t>7/14/20</a:t>
             </a:fld>
             <a:endParaRPr lang="en-US"/>
           </a:p>
@@ -2380,7 +2380,7 @@
           <a:p>
             <a:fld id="{2A1D230E-EC42-2149-ABD7-39503694EAD2}" type="datetimeFigureOut">
               <a:rPr lang="en-US" smtClean="0"/>
-              <a:t>7/5/20</a:t>
+              <a:t>7/14/20</a:t>
             </a:fld>
             <a:endParaRPr lang="en-US"/>
           </a:p>
@@ -2668,7 +2668,7 @@
           <a:p>
             <a:fld id="{2A1D230E-EC42-2149-ABD7-39503694EAD2}" type="datetimeFigureOut">
               <a:rPr lang="en-US" smtClean="0"/>
-              <a:t>7/5/20</a:t>
+              <a:t>7/14/20</a:t>
             </a:fld>
             <a:endParaRPr lang="en-US"/>
           </a:p>
@@ -2909,7 +2909,7 @@
           <a:p>
             <a:fld id="{2A1D230E-EC42-2149-ABD7-39503694EAD2}" type="datetimeFigureOut">
               <a:rPr lang="en-US" smtClean="0"/>
-              <a:t>7/5/20</a:t>
+              <a:t>7/14/20</a:t>
             </a:fld>
             <a:endParaRPr lang="en-US"/>
           </a:p>
@@ -4483,12 +4483,20 @@
           </a:p>
           <a:p>
             <a:r>
+              <a:rPr lang="en-US">
+                <a:solidFill>
+                  <a:schemeClr val="tx1"/>
+                </a:solidFill>
+              </a:rPr>
+              <a:t>password</a:t>
+            </a:r>
+            <a:r>
               <a:rPr lang="en-US" dirty="0" err="1">
                 <a:solidFill>
                   <a:schemeClr val="tx1"/>
                 </a:solidFill>
               </a:rPr>
-              <a:t>password_digest</a:t>
+              <a:t>_digest</a:t>
             </a:r>
             <a:r>
               <a:rPr lang="en-US" dirty="0">

</xml_diff>

<commit_message>
Added columns to Project model
- short_description: a description of the project to be displayed on the project index page
- thumbnail: an uploaded_file that is an image and will be displayed on the project index page
- category: a broad category for this project. On the project index page, projects will be grouped by category.
</commit_message>
<xml_diff>
--- a/doc/Portfolio website planning.pptx
+++ b/doc/Portfolio website planning.pptx
@@ -259,7 +259,7 @@
           <a:p>
             <a:fld id="{2A1D230E-EC42-2149-ABD7-39503694EAD2}" type="datetimeFigureOut">
               <a:rPr lang="en-US" smtClean="0"/>
-              <a:t>7/14/20</a:t>
+              <a:t>8/11/20</a:t>
             </a:fld>
             <a:endParaRPr lang="en-US"/>
           </a:p>
@@ -457,7 +457,7 @@
           <a:p>
             <a:fld id="{2A1D230E-EC42-2149-ABD7-39503694EAD2}" type="datetimeFigureOut">
               <a:rPr lang="en-US" smtClean="0"/>
-              <a:t>7/14/20</a:t>
+              <a:t>8/11/20</a:t>
             </a:fld>
             <a:endParaRPr lang="en-US"/>
           </a:p>
@@ -665,7 +665,7 @@
           <a:p>
             <a:fld id="{2A1D230E-EC42-2149-ABD7-39503694EAD2}" type="datetimeFigureOut">
               <a:rPr lang="en-US" smtClean="0"/>
-              <a:t>7/14/20</a:t>
+              <a:t>8/11/20</a:t>
             </a:fld>
             <a:endParaRPr lang="en-US"/>
           </a:p>
@@ -863,7 +863,7 @@
           <a:p>
             <a:fld id="{2A1D230E-EC42-2149-ABD7-39503694EAD2}" type="datetimeFigureOut">
               <a:rPr lang="en-US" smtClean="0"/>
-              <a:t>7/14/20</a:t>
+              <a:t>8/11/20</a:t>
             </a:fld>
             <a:endParaRPr lang="en-US"/>
           </a:p>
@@ -1138,7 +1138,7 @@
           <a:p>
             <a:fld id="{2A1D230E-EC42-2149-ABD7-39503694EAD2}" type="datetimeFigureOut">
               <a:rPr lang="en-US" smtClean="0"/>
-              <a:t>7/14/20</a:t>
+              <a:t>8/11/20</a:t>
             </a:fld>
             <a:endParaRPr lang="en-US"/>
           </a:p>
@@ -1403,7 +1403,7 @@
           <a:p>
             <a:fld id="{2A1D230E-EC42-2149-ABD7-39503694EAD2}" type="datetimeFigureOut">
               <a:rPr lang="en-US" smtClean="0"/>
-              <a:t>7/14/20</a:t>
+              <a:t>8/11/20</a:t>
             </a:fld>
             <a:endParaRPr lang="en-US"/>
           </a:p>
@@ -1815,7 +1815,7 @@
           <a:p>
             <a:fld id="{2A1D230E-EC42-2149-ABD7-39503694EAD2}" type="datetimeFigureOut">
               <a:rPr lang="en-US" smtClean="0"/>
-              <a:t>7/14/20</a:t>
+              <a:t>8/11/20</a:t>
             </a:fld>
             <a:endParaRPr lang="en-US"/>
           </a:p>
@@ -1956,7 +1956,7 @@
           <a:p>
             <a:fld id="{2A1D230E-EC42-2149-ABD7-39503694EAD2}" type="datetimeFigureOut">
               <a:rPr lang="en-US" smtClean="0"/>
-              <a:t>7/14/20</a:t>
+              <a:t>8/11/20</a:t>
             </a:fld>
             <a:endParaRPr lang="en-US"/>
           </a:p>
@@ -2069,7 +2069,7 @@
           <a:p>
             <a:fld id="{2A1D230E-EC42-2149-ABD7-39503694EAD2}" type="datetimeFigureOut">
               <a:rPr lang="en-US" smtClean="0"/>
-              <a:t>7/14/20</a:t>
+              <a:t>8/11/20</a:t>
             </a:fld>
             <a:endParaRPr lang="en-US"/>
           </a:p>
@@ -2380,7 +2380,7 @@
           <a:p>
             <a:fld id="{2A1D230E-EC42-2149-ABD7-39503694EAD2}" type="datetimeFigureOut">
               <a:rPr lang="en-US" smtClean="0"/>
-              <a:t>7/14/20</a:t>
+              <a:t>8/11/20</a:t>
             </a:fld>
             <a:endParaRPr lang="en-US"/>
           </a:p>
@@ -2668,7 +2668,7 @@
           <a:p>
             <a:fld id="{2A1D230E-EC42-2149-ABD7-39503694EAD2}" type="datetimeFigureOut">
               <a:rPr lang="en-US" smtClean="0"/>
-              <a:t>7/14/20</a:t>
+              <a:t>8/11/20</a:t>
             </a:fld>
             <a:endParaRPr lang="en-US"/>
           </a:p>
@@ -2909,7 +2909,7 @@
           <a:p>
             <a:fld id="{2A1D230E-EC42-2149-ABD7-39503694EAD2}" type="datetimeFigureOut">
               <a:rPr lang="en-US" smtClean="0"/>
-              <a:t>7/14/20</a:t>
+              <a:t>8/11/20</a:t>
             </a:fld>
             <a:endParaRPr lang="en-US"/>
           </a:p>
@@ -3340,8 +3340,8 @@
         </p:nvSpPr>
         <p:spPr>
           <a:xfrm>
-            <a:off x="4122737" y="824246"/>
-            <a:ext cx="2951824" cy="2279895"/>
+            <a:off x="4122737" y="497920"/>
+            <a:ext cx="2951824" cy="3285232"/>
           </a:xfrm>
           <a:prstGeom prst="rect">
             <a:avLst/>
@@ -3452,12 +3452,50 @@
           </a:p>
           <a:p>
             <a:r>
+              <a:rPr lang="en-US" dirty="0" err="1">
+                <a:solidFill>
+                  <a:schemeClr val="tx1"/>
+                </a:solidFill>
+              </a:rPr>
+              <a:t>short_description</a:t>
+            </a:r>
+            <a:r>
               <a:rPr lang="en-US" dirty="0">
                 <a:solidFill>
                   <a:schemeClr val="tx1"/>
                 </a:solidFill>
               </a:rPr>
+              <a:t>	string</a:t>
+            </a:r>
+          </a:p>
+          <a:p>
+            <a:r>
+              <a:rPr lang="en-US" dirty="0">
+                <a:solidFill>
+                  <a:schemeClr val="tx1"/>
+                </a:solidFill>
+              </a:rPr>
               <a:t>description	text</a:t>
+            </a:r>
+          </a:p>
+          <a:p>
+            <a:r>
+              <a:rPr lang="en-US" dirty="0">
+                <a:solidFill>
+                  <a:schemeClr val="tx1"/>
+                </a:solidFill>
+              </a:rPr>
+              <a:t>category		string</a:t>
+            </a:r>
+          </a:p>
+          <a:p>
+            <a:r>
+              <a:rPr lang="en-US" dirty="0">
+                <a:solidFill>
+                  <a:schemeClr val="tx1"/>
+                </a:solidFill>
+              </a:rPr>
+              <a:t>thumbnail	FK</a:t>
             </a:r>
           </a:p>
           <a:p>
@@ -3778,12 +3816,12 @@
           <a:lstStyle/>
           <a:p>
             <a:r>
-              <a:rPr lang="en-US" b="1" dirty="0">
-                <a:solidFill>
-                  <a:schemeClr val="tx1"/>
-                </a:solidFill>
-              </a:rPr>
-              <a:t>File</a:t>
+              <a:rPr lang="en-US" b="1" dirty="0" err="1">
+                <a:solidFill>
+                  <a:schemeClr val="tx1"/>
+                </a:solidFill>
+              </a:rPr>
+              <a:t>Uploaded_File</a:t>
             </a:r>
             <a:endParaRPr lang="en-US" dirty="0">
               <a:solidFill>
@@ -4357,8 +4395,8 @@
         </p:nvCxnSpPr>
         <p:spPr>
           <a:xfrm>
-            <a:off x="5598649" y="3104141"/>
-            <a:ext cx="0" cy="837622"/>
+            <a:off x="5598649" y="3783152"/>
+            <a:ext cx="0" cy="158611"/>
           </a:xfrm>
           <a:prstGeom prst="straightConnector1">
             <a:avLst/>
@@ -4473,30 +4511,40 @@
           </a:p>
           <a:p>
             <a:r>
+              <a:rPr lang="en-US" dirty="0" err="1">
+                <a:solidFill>
+                  <a:schemeClr val="tx1"/>
+                </a:solidFill>
+              </a:rPr>
+              <a:t>isername</a:t>
+            </a:r>
+            <a:r>
               <a:rPr lang="en-US" dirty="0">
                 <a:solidFill>
                   <a:schemeClr val="tx1"/>
                 </a:solidFill>
               </a:rPr>
+              <a:t>	int</a:t>
+            </a:r>
+          </a:p>
+          <a:p>
+            <a:r>
+              <a:rPr lang="en-US" dirty="0">
+                <a:solidFill>
+                  <a:schemeClr val="tx1"/>
+                </a:solidFill>
+              </a:rPr>
               <a:t>authority		string</a:t>
             </a:r>
           </a:p>
           <a:p>
             <a:r>
-              <a:rPr lang="en-US">
-                <a:solidFill>
-                  <a:schemeClr val="tx1"/>
-                </a:solidFill>
-              </a:rPr>
-              <a:t>password</a:t>
-            </a:r>
-            <a:r>
               <a:rPr lang="en-US" dirty="0" err="1">
                 <a:solidFill>
                   <a:schemeClr val="tx1"/>
                 </a:solidFill>
               </a:rPr>
-              <a:t>_digest</a:t>
+              <a:t>password_digest</a:t>
             </a:r>
             <a:r>
               <a:rPr lang="en-US" dirty="0">
@@ -4579,6 +4627,55 @@
           </a:p>
         </p:txBody>
       </p:sp>
+      <p:cxnSp>
+        <p:nvCxnSpPr>
+          <p:cNvPr id="9" name="Elbow Connector 8">
+            <a:extLst>
+              <a:ext uri="{FF2B5EF4-FFF2-40B4-BE49-F238E27FC236}">
+                <a16:creationId xmlns:a16="http://schemas.microsoft.com/office/drawing/2014/main" id="{336B22C8-8712-6F42-AA14-0A8478F0AA73}"/>
+              </a:ext>
+            </a:extLst>
+          </p:cNvPr>
+          <p:cNvCxnSpPr>
+            <a:cxnSpLocks/>
+          </p:cNvCxnSpPr>
+          <p:nvPr/>
+        </p:nvCxnSpPr>
+        <p:spPr>
+          <a:xfrm flipV="1">
+            <a:off x="3306340" y="2953269"/>
+            <a:ext cx="816399" cy="688455"/>
+          </a:xfrm>
+          <a:prstGeom prst="bentConnector3">
+            <a:avLst>
+              <a:gd name="adj1" fmla="val 460"/>
+            </a:avLst>
+          </a:prstGeom>
+          <a:ln w="38100">
+            <a:solidFill>
+              <a:schemeClr val="accent6">
+                <a:lumMod val="50000"/>
+              </a:schemeClr>
+            </a:solidFill>
+            <a:headEnd type="diamond" w="lg" len="lg"/>
+            <a:tailEnd type="arrow" w="lg" len="lg"/>
+          </a:ln>
+        </p:spPr>
+        <p:style>
+          <a:lnRef idx="1">
+            <a:schemeClr val="accent1"/>
+          </a:lnRef>
+          <a:fillRef idx="0">
+            <a:schemeClr val="accent1"/>
+          </a:fillRef>
+          <a:effectRef idx="0">
+            <a:schemeClr val="accent1"/>
+          </a:effectRef>
+          <a:fontRef idx="minor">
+            <a:schemeClr val="tx1"/>
+          </a:fontRef>
+        </p:style>
+      </p:cxnSp>
     </p:spTree>
     <p:extLst>
       <p:ext uri="{BB962C8B-B14F-4D97-AF65-F5344CB8AC3E}">

</xml_diff>

<commit_message>
Added a "priority" column to projects
Projects in the list will be sorted by this value.
</commit_message>
<xml_diff>
--- a/doc/Portfolio website planning.pptx
+++ b/doc/Portfolio website planning.pptx
@@ -259,7 +259,7 @@
           <a:p>
             <a:fld id="{2A1D230E-EC42-2149-ABD7-39503694EAD2}" type="datetimeFigureOut">
               <a:rPr lang="en-US" smtClean="0"/>
-              <a:t>8/11/20</a:t>
+              <a:t>8/12/20</a:t>
             </a:fld>
             <a:endParaRPr lang="en-US"/>
           </a:p>
@@ -457,7 +457,7 @@
           <a:p>
             <a:fld id="{2A1D230E-EC42-2149-ABD7-39503694EAD2}" type="datetimeFigureOut">
               <a:rPr lang="en-US" smtClean="0"/>
-              <a:t>8/11/20</a:t>
+              <a:t>8/12/20</a:t>
             </a:fld>
             <a:endParaRPr lang="en-US"/>
           </a:p>
@@ -665,7 +665,7 @@
           <a:p>
             <a:fld id="{2A1D230E-EC42-2149-ABD7-39503694EAD2}" type="datetimeFigureOut">
               <a:rPr lang="en-US" smtClean="0"/>
-              <a:t>8/11/20</a:t>
+              <a:t>8/12/20</a:t>
             </a:fld>
             <a:endParaRPr lang="en-US"/>
           </a:p>
@@ -863,7 +863,7 @@
           <a:p>
             <a:fld id="{2A1D230E-EC42-2149-ABD7-39503694EAD2}" type="datetimeFigureOut">
               <a:rPr lang="en-US" smtClean="0"/>
-              <a:t>8/11/20</a:t>
+              <a:t>8/12/20</a:t>
             </a:fld>
             <a:endParaRPr lang="en-US"/>
           </a:p>
@@ -1138,7 +1138,7 @@
           <a:p>
             <a:fld id="{2A1D230E-EC42-2149-ABD7-39503694EAD2}" type="datetimeFigureOut">
               <a:rPr lang="en-US" smtClean="0"/>
-              <a:t>8/11/20</a:t>
+              <a:t>8/12/20</a:t>
             </a:fld>
             <a:endParaRPr lang="en-US"/>
           </a:p>
@@ -1403,7 +1403,7 @@
           <a:p>
             <a:fld id="{2A1D230E-EC42-2149-ABD7-39503694EAD2}" type="datetimeFigureOut">
               <a:rPr lang="en-US" smtClean="0"/>
-              <a:t>8/11/20</a:t>
+              <a:t>8/12/20</a:t>
             </a:fld>
             <a:endParaRPr lang="en-US"/>
           </a:p>
@@ -1815,7 +1815,7 @@
           <a:p>
             <a:fld id="{2A1D230E-EC42-2149-ABD7-39503694EAD2}" type="datetimeFigureOut">
               <a:rPr lang="en-US" smtClean="0"/>
-              <a:t>8/11/20</a:t>
+              <a:t>8/12/20</a:t>
             </a:fld>
             <a:endParaRPr lang="en-US"/>
           </a:p>
@@ -1956,7 +1956,7 @@
           <a:p>
             <a:fld id="{2A1D230E-EC42-2149-ABD7-39503694EAD2}" type="datetimeFigureOut">
               <a:rPr lang="en-US" smtClean="0"/>
-              <a:t>8/11/20</a:t>
+              <a:t>8/12/20</a:t>
             </a:fld>
             <a:endParaRPr lang="en-US"/>
           </a:p>
@@ -2069,7 +2069,7 @@
           <a:p>
             <a:fld id="{2A1D230E-EC42-2149-ABD7-39503694EAD2}" type="datetimeFigureOut">
               <a:rPr lang="en-US" smtClean="0"/>
-              <a:t>8/11/20</a:t>
+              <a:t>8/12/20</a:t>
             </a:fld>
             <a:endParaRPr lang="en-US"/>
           </a:p>
@@ -2380,7 +2380,7 @@
           <a:p>
             <a:fld id="{2A1D230E-EC42-2149-ABD7-39503694EAD2}" type="datetimeFigureOut">
               <a:rPr lang="en-US" smtClean="0"/>
-              <a:t>8/11/20</a:t>
+              <a:t>8/12/20</a:t>
             </a:fld>
             <a:endParaRPr lang="en-US"/>
           </a:p>
@@ -2668,7 +2668,7 @@
           <a:p>
             <a:fld id="{2A1D230E-EC42-2149-ABD7-39503694EAD2}" type="datetimeFigureOut">
               <a:rPr lang="en-US" smtClean="0"/>
-              <a:t>8/11/20</a:t>
+              <a:t>8/12/20</a:t>
             </a:fld>
             <a:endParaRPr lang="en-US"/>
           </a:p>
@@ -2909,7 +2909,7 @@
           <a:p>
             <a:fld id="{2A1D230E-EC42-2149-ABD7-39503694EAD2}" type="datetimeFigureOut">
               <a:rPr lang="en-US" smtClean="0"/>
-              <a:t>8/11/20</a:t>
+              <a:t>8/12/20</a:t>
             </a:fld>
             <a:endParaRPr lang="en-US"/>
           </a:p>
@@ -3340,8 +3340,8 @@
         </p:nvSpPr>
         <p:spPr>
           <a:xfrm>
-            <a:off x="4122737" y="497920"/>
-            <a:ext cx="2951824" cy="3285232"/>
+            <a:off x="4122737" y="0"/>
+            <a:ext cx="2951824" cy="3783152"/>
           </a:xfrm>
           <a:prstGeom prst="rect">
             <a:avLst/>
@@ -3496,6 +3496,16 @@
                 </a:solidFill>
               </a:rPr>
               <a:t>thumbnail	FK</a:t>
+            </a:r>
+          </a:p>
+          <a:p>
+            <a:r>
+              <a:rPr lang="en-US" dirty="0">
+                <a:solidFill>
+                  <a:schemeClr val="tx1"/>
+                </a:solidFill>
+              </a:rPr>
+              <a:t>priority		int</a:t>
             </a:r>
           </a:p>
           <a:p>

</xml_diff>

<commit_message>
Minor updates to documentation
</commit_message>
<xml_diff>
--- a/doc/Portfolio website planning.pptx
+++ b/doc/Portfolio website planning.pptx
@@ -259,7 +259,7 @@
           <a:p>
             <a:fld id="{2A1D230E-EC42-2149-ABD7-39503694EAD2}" type="datetimeFigureOut">
               <a:rPr lang="en-US" smtClean="0"/>
-              <a:t>8/12/20</a:t>
+              <a:t>9/15/20</a:t>
             </a:fld>
             <a:endParaRPr lang="en-US"/>
           </a:p>
@@ -457,7 +457,7 @@
           <a:p>
             <a:fld id="{2A1D230E-EC42-2149-ABD7-39503694EAD2}" type="datetimeFigureOut">
               <a:rPr lang="en-US" smtClean="0"/>
-              <a:t>8/12/20</a:t>
+              <a:t>9/15/20</a:t>
             </a:fld>
             <a:endParaRPr lang="en-US"/>
           </a:p>
@@ -665,7 +665,7 @@
           <a:p>
             <a:fld id="{2A1D230E-EC42-2149-ABD7-39503694EAD2}" type="datetimeFigureOut">
               <a:rPr lang="en-US" smtClean="0"/>
-              <a:t>8/12/20</a:t>
+              <a:t>9/15/20</a:t>
             </a:fld>
             <a:endParaRPr lang="en-US"/>
           </a:p>
@@ -863,7 +863,7 @@
           <a:p>
             <a:fld id="{2A1D230E-EC42-2149-ABD7-39503694EAD2}" type="datetimeFigureOut">
               <a:rPr lang="en-US" smtClean="0"/>
-              <a:t>8/12/20</a:t>
+              <a:t>9/15/20</a:t>
             </a:fld>
             <a:endParaRPr lang="en-US"/>
           </a:p>
@@ -1138,7 +1138,7 @@
           <a:p>
             <a:fld id="{2A1D230E-EC42-2149-ABD7-39503694EAD2}" type="datetimeFigureOut">
               <a:rPr lang="en-US" smtClean="0"/>
-              <a:t>8/12/20</a:t>
+              <a:t>9/15/20</a:t>
             </a:fld>
             <a:endParaRPr lang="en-US"/>
           </a:p>
@@ -1403,7 +1403,7 @@
           <a:p>
             <a:fld id="{2A1D230E-EC42-2149-ABD7-39503694EAD2}" type="datetimeFigureOut">
               <a:rPr lang="en-US" smtClean="0"/>
-              <a:t>8/12/20</a:t>
+              <a:t>9/15/20</a:t>
             </a:fld>
             <a:endParaRPr lang="en-US"/>
           </a:p>
@@ -1815,7 +1815,7 @@
           <a:p>
             <a:fld id="{2A1D230E-EC42-2149-ABD7-39503694EAD2}" type="datetimeFigureOut">
               <a:rPr lang="en-US" smtClean="0"/>
-              <a:t>8/12/20</a:t>
+              <a:t>9/15/20</a:t>
             </a:fld>
             <a:endParaRPr lang="en-US"/>
           </a:p>
@@ -1956,7 +1956,7 @@
           <a:p>
             <a:fld id="{2A1D230E-EC42-2149-ABD7-39503694EAD2}" type="datetimeFigureOut">
               <a:rPr lang="en-US" smtClean="0"/>
-              <a:t>8/12/20</a:t>
+              <a:t>9/15/20</a:t>
             </a:fld>
             <a:endParaRPr lang="en-US"/>
           </a:p>
@@ -2069,7 +2069,7 @@
           <a:p>
             <a:fld id="{2A1D230E-EC42-2149-ABD7-39503694EAD2}" type="datetimeFigureOut">
               <a:rPr lang="en-US" smtClean="0"/>
-              <a:t>8/12/20</a:t>
+              <a:t>9/15/20</a:t>
             </a:fld>
             <a:endParaRPr lang="en-US"/>
           </a:p>
@@ -2380,7 +2380,7 @@
           <a:p>
             <a:fld id="{2A1D230E-EC42-2149-ABD7-39503694EAD2}" type="datetimeFigureOut">
               <a:rPr lang="en-US" smtClean="0"/>
-              <a:t>8/12/20</a:t>
+              <a:t>9/15/20</a:t>
             </a:fld>
             <a:endParaRPr lang="en-US"/>
           </a:p>
@@ -2668,7 +2668,7 @@
           <a:p>
             <a:fld id="{2A1D230E-EC42-2149-ABD7-39503694EAD2}" type="datetimeFigureOut">
               <a:rPr lang="en-US" smtClean="0"/>
-              <a:t>8/12/20</a:t>
+              <a:t>9/15/20</a:t>
             </a:fld>
             <a:endParaRPr lang="en-US"/>
           </a:p>
@@ -2909,7 +2909,7 @@
           <a:p>
             <a:fld id="{2A1D230E-EC42-2149-ABD7-39503694EAD2}" type="datetimeFigureOut">
               <a:rPr lang="en-US" smtClean="0"/>
-              <a:t>8/12/20</a:t>
+              <a:t>9/15/20</a:t>
             </a:fld>
             <a:endParaRPr lang="en-US"/>
           </a:p>
@@ -3340,8 +3340,8 @@
         </p:nvSpPr>
         <p:spPr>
           <a:xfrm>
-            <a:off x="4122737" y="0"/>
-            <a:ext cx="2951824" cy="3783152"/>
+            <a:off x="4122738" y="158619"/>
+            <a:ext cx="2951824" cy="3428998"/>
           </a:xfrm>
           <a:prstGeom prst="rect">
             <a:avLst/>
@@ -3788,8 +3788,8 @@
         </p:nvSpPr>
         <p:spPr>
           <a:xfrm>
-            <a:off x="690562" y="3641724"/>
-            <a:ext cx="3039596" cy="2273298"/>
+            <a:off x="690562" y="3641723"/>
+            <a:ext cx="3039596" cy="2794651"/>
           </a:xfrm>
           <a:prstGeom prst="rect">
             <a:avLst/>
@@ -3943,6 +3943,24 @@
                 <a:schemeClr val="tx1"/>
               </a:solidFill>
             </a:endParaRPr>
+          </a:p>
+          <a:p>
+            <a:r>
+              <a:rPr lang="en-US" dirty="0" err="1">
+                <a:solidFill>
+                  <a:schemeClr val="tx1"/>
+                </a:solidFill>
+              </a:rPr>
+              <a:t>cw_file</a:t>
+            </a:r>
+            <a:r>
+              <a:rPr lang="en-US" dirty="0">
+                <a:solidFill>
+                  <a:schemeClr val="tx1"/>
+                </a:solidFill>
+              </a:rPr>
+              <a:t>		string</a:t>
+            </a:r>
           </a:p>
         </p:txBody>
       </p:sp>
@@ -4070,7 +4088,7 @@
         <p:spPr>
           <a:xfrm flipH="1" flipV="1">
             <a:off x="2204704" y="2524918"/>
-            <a:ext cx="5656" cy="1116806"/>
+            <a:ext cx="5656" cy="1116805"/>
           </a:xfrm>
           <a:prstGeom prst="straightConnector1">
             <a:avLst/>
@@ -4255,7 +4273,7 @@
         </p:nvSpPr>
         <p:spPr>
           <a:xfrm>
-            <a:off x="4574041" y="3941763"/>
+            <a:off x="4574041" y="4224992"/>
             <a:ext cx="2049216" cy="2483100"/>
           </a:xfrm>
           <a:prstGeom prst="rect">
@@ -4404,9 +4422,9 @@
           <p:nvPr/>
         </p:nvCxnSpPr>
         <p:spPr>
-          <a:xfrm>
-            <a:off x="5598649" y="3783152"/>
-            <a:ext cx="0" cy="158611"/>
+          <a:xfrm flipH="1">
+            <a:off x="5598649" y="3587617"/>
+            <a:ext cx="1" cy="637375"/>
           </a:xfrm>
           <a:prstGeom prst="straightConnector1">
             <a:avLst/>
@@ -4451,7 +4469,7 @@
         <p:spPr>
           <a:xfrm>
             <a:off x="8097700" y="4224992"/>
-            <a:ext cx="2682596" cy="1631943"/>
+            <a:ext cx="2682596" cy="2001700"/>
           </a:xfrm>
           <a:prstGeom prst="rect">
             <a:avLst/>
@@ -4521,12 +4539,32 @@
           </a:p>
           <a:p>
             <a:r>
+              <a:rPr lang="en-US" dirty="0">
+                <a:solidFill>
+                  <a:schemeClr val="tx1"/>
+                </a:solidFill>
+              </a:rPr>
+              <a:t>username	string</a:t>
+            </a:r>
+          </a:p>
+          <a:p>
+            <a:r>
+              <a:rPr lang="en-US" dirty="0">
+                <a:solidFill>
+                  <a:schemeClr val="tx1"/>
+                </a:solidFill>
+              </a:rPr>
+              <a:t>authority		string</a:t>
+            </a:r>
+          </a:p>
+          <a:p>
+            <a:r>
               <a:rPr lang="en-US" dirty="0" err="1">
                 <a:solidFill>
                   <a:schemeClr val="tx1"/>
                 </a:solidFill>
               </a:rPr>
-              <a:t>isername</a:t>
+              <a:t>password_digest</a:t>
             </a:r>
             <a:r>
               <a:rPr lang="en-US" dirty="0">
@@ -4534,70 +4572,7 @@
                   <a:schemeClr val="tx1"/>
                 </a:solidFill>
               </a:rPr>
-              <a:t>	int</a:t>
-            </a:r>
-          </a:p>
-          <a:p>
-            <a:r>
-              <a:rPr lang="en-US" dirty="0">
-                <a:solidFill>
-                  <a:schemeClr val="tx1"/>
-                </a:solidFill>
-              </a:rPr>
-              <a:t>authority		string</a:t>
-            </a:r>
-          </a:p>
-          <a:p>
-            <a:r>
-              <a:rPr lang="en-US" dirty="0" err="1">
-                <a:solidFill>
-                  <a:schemeClr val="tx1"/>
-                </a:solidFill>
-              </a:rPr>
-              <a:t>password_digest</a:t>
-            </a:r>
-            <a:r>
-              <a:rPr lang="en-US" dirty="0">
-                <a:solidFill>
-                  <a:schemeClr val="tx1"/>
-                </a:solidFill>
-              </a:rPr>
               <a:t>	string</a:t>
-            </a:r>
-          </a:p>
-        </p:txBody>
-      </p:sp>
-      <p:sp>
-        <p:nvSpPr>
-          <p:cNvPr id="28" name="TextBox 27">
-            <a:extLst>
-              <a:ext uri="{FF2B5EF4-FFF2-40B4-BE49-F238E27FC236}">
-                <a16:creationId xmlns:a16="http://schemas.microsoft.com/office/drawing/2014/main" id="{853534F1-659C-E242-A33A-B17B91F81A03}"/>
-              </a:ext>
-            </a:extLst>
-          </p:cNvPr>
-          <p:cNvSpPr txBox="1"/>
-          <p:nvPr/>
-        </p:nvSpPr>
-        <p:spPr>
-          <a:xfrm>
-            <a:off x="542925" y="128588"/>
-            <a:ext cx="2309017" cy="369332"/>
-          </a:xfrm>
-          <a:prstGeom prst="rect">
-            <a:avLst/>
-          </a:prstGeom>
-          <a:noFill/>
-        </p:spPr>
-        <p:txBody>
-          <a:bodyPr wrap="square" rtlCol="0">
-            <a:spAutoFit/>
-          </a:bodyPr>
-          <a:lstStyle/>
-          <a:p>
-            <a:r>
-              <a:rPr lang="en-US" dirty="0"/>
-              <a:t>To do: classes, jobs</a:t>
             </a:r>
           </a:p>
         </p:txBody>
@@ -4652,13 +4627,13 @@
           <p:nvPr/>
         </p:nvCxnSpPr>
         <p:spPr>
-          <a:xfrm flipV="1">
-            <a:off x="3306340" y="2953269"/>
-            <a:ext cx="816399" cy="688455"/>
+          <a:xfrm rot="5400000" flipH="1" flipV="1">
+            <a:off x="3295438" y="2814427"/>
+            <a:ext cx="838200" cy="816397"/>
           </a:xfrm>
           <a:prstGeom prst="bentConnector3">
             <a:avLst>
-              <a:gd name="adj1" fmla="val 460"/>
+              <a:gd name="adj1" fmla="val 99857"/>
             </a:avLst>
           </a:prstGeom>
           <a:ln w="38100">

</xml_diff>